<commit_message>
Big ol' web update
</commit_message>
<xml_diff>
--- a/16216/f15/lectures/16.216f15_lec25_exam2_preview.pptx
+++ b/16216/f15/lectures/16.216f15_lec25_exam2_preview.pptx
@@ -526,7 +526,7 @@
         <p:nvSpPr>
           <p:cNvPr id="16388" name="Rectangle 4"/>
           <p:cNvSpPr>
-            <a:spLocks noRot="1" noChangeArrowheads="1" noTextEdit="1"/>
+            <a:spLocks noGrp="1" noRot="1" noChangeAspect="1" noChangeArrowheads="1" noTextEdit="1"/>
           </p:cNvSpPr>
           <p:nvPr>
             <p:ph type="sldImg" idx="2"/>
@@ -1047,7 +1047,7 @@
         <p:nvSpPr>
           <p:cNvPr id="19458" name="Rectangle 2"/>
           <p:cNvSpPr>
-            <a:spLocks noRot="1" noChangeArrowheads="1" noTextEdit="1"/>
+            <a:spLocks noGrp="1" noRot="1" noChangeAspect="1" noChangeArrowheads="1" noTextEdit="1"/>
           </p:cNvSpPr>
           <p:nvPr>
             <p:ph type="sldImg"/>
@@ -1340,7 +1340,7 @@
               <a:pPr>
                 <a:defRPr/>
               </a:pPr>
-              <a:t>10/30/15</a:t>
+              <a:t>11/2/15</a:t>
             </a:fld>
             <a:endParaRPr lang="en-US"/>
           </a:p>
@@ -1547,7 +1547,7 @@
               <a:pPr>
                 <a:defRPr/>
               </a:pPr>
-              <a:t>10/30/15</a:t>
+              <a:t>11/2/15</a:t>
             </a:fld>
             <a:endParaRPr lang="en-US"/>
           </a:p>
@@ -1763,7 +1763,7 @@
               <a:pPr>
                 <a:defRPr/>
               </a:pPr>
-              <a:t>10/30/15</a:t>
+              <a:t>11/2/15</a:t>
             </a:fld>
             <a:endParaRPr lang="en-US"/>
           </a:p>
@@ -2036,7 +2036,7 @@
               <a:pPr>
                 <a:defRPr/>
               </a:pPr>
-              <a:t>10/30/15</a:t>
+              <a:t>11/2/15</a:t>
             </a:fld>
             <a:endParaRPr lang="en-US"/>
           </a:p>
@@ -2309,7 +2309,7 @@
               <a:pPr>
                 <a:defRPr/>
               </a:pPr>
-              <a:t>10/30/15</a:t>
+              <a:t>11/2/15</a:t>
             </a:fld>
             <a:endParaRPr lang="en-US"/>
           </a:p>
@@ -2515,7 +2515,7 @@
               <a:pPr>
                 <a:defRPr/>
               </a:pPr>
-              <a:t>10/30/15</a:t>
+              <a:t>11/2/15</a:t>
             </a:fld>
             <a:endParaRPr lang="en-US"/>
           </a:p>
@@ -2743,7 +2743,7 @@
               <a:pPr>
                 <a:defRPr/>
               </a:pPr>
-              <a:t>10/30/15</a:t>
+              <a:t>11/2/15</a:t>
             </a:fld>
             <a:endParaRPr lang="en-US"/>
           </a:p>
@@ -3067,7 +3067,7 @@
               <a:pPr>
                 <a:defRPr/>
               </a:pPr>
-              <a:t>10/30/15</a:t>
+              <a:t>11/2/15</a:t>
             </a:fld>
             <a:endParaRPr lang="en-US"/>
           </a:p>
@@ -3530,7 +3530,7 @@
               <a:pPr>
                 <a:defRPr/>
               </a:pPr>
-              <a:t>10/30/15</a:t>
+              <a:t>11/2/15</a:t>
             </a:fld>
             <a:endParaRPr lang="en-US"/>
           </a:p>
@@ -3684,7 +3684,7 @@
               <a:pPr>
                 <a:defRPr/>
               </a:pPr>
-              <a:t>10/30/15</a:t>
+              <a:t>11/2/15</a:t>
             </a:fld>
             <a:endParaRPr lang="en-US"/>
           </a:p>
@@ -3815,7 +3815,7 @@
               <a:pPr>
                 <a:defRPr/>
               </a:pPr>
-              <a:t>10/30/15</a:t>
+              <a:t>11/2/15</a:t>
             </a:fld>
             <a:endParaRPr lang="en-US"/>
           </a:p>
@@ -4128,7 +4128,7 @@
               <a:pPr>
                 <a:defRPr/>
               </a:pPr>
-              <a:t>10/30/15</a:t>
+              <a:t>11/2/15</a:t>
             </a:fld>
             <a:endParaRPr lang="en-US"/>
           </a:p>
@@ -4418,7 +4418,7 @@
               <a:pPr>
                 <a:defRPr/>
               </a:pPr>
-              <a:t>10/30/15</a:t>
+              <a:t>11/2/15</a:t>
             </a:fld>
             <a:endParaRPr lang="en-US"/>
           </a:p>
@@ -4728,7 +4728,7 @@
               <a:pPr>
                 <a:defRPr/>
               </a:pPr>
-              <a:t>10/30/15</a:t>
+              <a:t>11/2/15</a:t>
             </a:fld>
             <a:endParaRPr lang="en-US"/>
           </a:p>
@@ -6225,7 +6225,7 @@
                 <a:latin typeface="Garamond" charset="0"/>
               </a:rPr>
               <a:pPr eaLnBrk="1" hangingPunct="1"/>
-              <a:t>10/30/15</a:t>
+              <a:t>11/2/15</a:t>
             </a:fld>
             <a:endParaRPr lang="en-US" sz="1200">
               <a:latin typeface="Garamond" charset="0"/>
@@ -6868,7 +6868,7 @@
                 <a:latin typeface="Garamond" charset="0"/>
               </a:rPr>
               <a:pPr eaLnBrk="1" hangingPunct="1"/>
-              <a:t>10/30/15</a:t>
+              <a:t>11/2/15</a:t>
             </a:fld>
             <a:endParaRPr lang="en-US" sz="1200">
               <a:latin typeface="Garamond" charset="0"/>
@@ -7695,7 +7695,7 @@
                 <a:latin typeface="Garamond" charset="0"/>
               </a:rPr>
               <a:pPr eaLnBrk="1" hangingPunct="1"/>
-              <a:t>10/30/15</a:t>
+              <a:t>11/2/15</a:t>
             </a:fld>
             <a:endParaRPr lang="en-US" sz="1200">
               <a:latin typeface="Garamond" charset="0"/>
@@ -8559,7 +8559,7 @@
                 <a:latin typeface="Garamond" charset="0"/>
               </a:rPr>
               <a:pPr eaLnBrk="1" hangingPunct="1"/>
-              <a:t>10/30/15</a:t>
+              <a:t>11/2/15</a:t>
             </a:fld>
             <a:endParaRPr lang="en-US" sz="1200">
               <a:latin typeface="Garamond" charset="0"/>
@@ -8954,9 +8954,6 @@
               </a:rPr>
               <a:t> deadline TBD</a:t>
             </a:r>
-            <a:endParaRPr lang="en-US" dirty="0" smtClean="0">
-              <a:latin typeface="Arial" charset="0"/>
-            </a:endParaRPr>
           </a:p>
         </p:txBody>
       </p:sp>
@@ -9110,7 +9107,7 @@
                 <a:latin typeface="Garamond" charset="0"/>
               </a:rPr>
               <a:pPr eaLnBrk="1" hangingPunct="1"/>
-              <a:t>10/30/15</a:t>
+              <a:t>11/2/15</a:t>
             </a:fld>
             <a:endParaRPr lang="en-US" sz="1200">
               <a:latin typeface="Garamond" charset="0"/>
@@ -9472,8 +9469,56 @@
               <a:rPr lang="en-US" dirty="0" smtClean="0">
                 <a:latin typeface="Arial" charset="0"/>
               </a:rPr>
-              <a:t> deadline TBD</a:t>
-            </a:r>
+              <a:t> deadline </a:t>
+            </a:r>
+            <a:r>
+              <a:rPr lang="en-US" dirty="0" smtClean="0">
+                <a:latin typeface="Arial" charset="0"/>
+              </a:rPr>
+              <a:t>TBD</a:t>
+            </a:r>
+          </a:p>
+          <a:p>
+            <a:pPr lvl="1">
+              <a:lnSpc>
+                <a:spcPct val="90000"/>
+              </a:lnSpc>
+            </a:pPr>
+            <a:r>
+              <a:rPr lang="en-US" dirty="0" smtClean="0">
+                <a:latin typeface="Arial" charset="0"/>
+              </a:rPr>
+              <a:t>Dr. Geiger’s office hours</a:t>
+            </a:r>
+          </a:p>
+          <a:p>
+            <a:pPr lvl="2">
+              <a:lnSpc>
+                <a:spcPct val="90000"/>
+              </a:lnSpc>
+            </a:pPr>
+            <a:r>
+              <a:rPr lang="en-US" dirty="0" smtClean="0">
+                <a:latin typeface="Arial" charset="0"/>
+              </a:rPr>
+              <a:t>Available T 11:30-12:30 &amp; 1:30-3 (+ usual W hours)</a:t>
+            </a:r>
+          </a:p>
+          <a:p>
+            <a:pPr lvl="2">
+              <a:lnSpc>
+                <a:spcPct val="90000"/>
+              </a:lnSpc>
+            </a:pPr>
+            <a:r>
+              <a:rPr lang="en-US" dirty="0" smtClean="0">
+                <a:latin typeface="Arial" charset="0"/>
+              </a:rPr>
+              <a:t>Not on campus Thursday</a:t>
+            </a:r>
+            <a:endParaRPr lang="en-US" dirty="0" smtClean="0">
+              <a:latin typeface="Arial" charset="0"/>
+            </a:endParaRPr>
           </a:p>
           <a:p>
             <a:r>
@@ -9641,7 +9686,7 @@
                 <a:latin typeface="Garamond" charset="0"/>
               </a:rPr>
               <a:pPr eaLnBrk="1" hangingPunct="1"/>
-              <a:t>10/30/15</a:t>
+              <a:t>11/2/15</a:t>
             </a:fld>
             <a:endParaRPr lang="en-US" sz="1200">
               <a:latin typeface="Garamond" charset="0"/>
@@ -10268,7 +10313,7 @@
                 <a:latin typeface="Garamond" charset="0"/>
               </a:rPr>
               <a:pPr eaLnBrk="1" hangingPunct="1"/>
-              <a:t>10/30/15</a:t>
+              <a:t>11/2/15</a:t>
             </a:fld>
             <a:endParaRPr lang="en-US" sz="1200">
               <a:latin typeface="Garamond" charset="0"/>
@@ -10932,7 +10977,7 @@
                 <a:latin typeface="Garamond" charset="0"/>
               </a:rPr>
               <a:pPr eaLnBrk="1" hangingPunct="1"/>
-              <a:t>10/30/15</a:t>
+              <a:t>11/2/15</a:t>
             </a:fld>
             <a:endParaRPr lang="en-US" sz="1200">
               <a:latin typeface="Garamond" charset="0"/>
@@ -11612,7 +11657,7 @@
                 <a:latin typeface="Garamond" charset="0"/>
               </a:rPr>
               <a:pPr eaLnBrk="1" hangingPunct="1"/>
-              <a:t>10/30/15</a:t>
+              <a:t>11/2/15</a:t>
             </a:fld>
             <a:endParaRPr lang="en-US" sz="1200">
               <a:latin typeface="Garamond" charset="0"/>
@@ -12178,7 +12223,7 @@
                 <a:latin typeface="Garamond" charset="0"/>
               </a:rPr>
               <a:pPr eaLnBrk="1" hangingPunct="1"/>
-              <a:t>10/30/15</a:t>
+              <a:t>11/2/15</a:t>
             </a:fld>
             <a:endParaRPr lang="en-US" sz="1200">
               <a:latin typeface="Garamond" charset="0"/>
@@ -12725,7 +12770,7 @@
                 <a:latin typeface="Garamond" charset="0"/>
               </a:rPr>
               <a:pPr eaLnBrk="1" hangingPunct="1"/>
-              <a:t>10/30/15</a:t>
+              <a:t>11/2/15</a:t>
             </a:fld>
             <a:endParaRPr lang="en-US" sz="1200">
               <a:latin typeface="Garamond" charset="0"/>
@@ -13373,7 +13418,7 @@
                 <a:latin typeface="Garamond" charset="0"/>
               </a:rPr>
               <a:pPr eaLnBrk="1" hangingPunct="1"/>
-              <a:t>10/30/15</a:t>
+              <a:t>11/2/15</a:t>
             </a:fld>
             <a:endParaRPr lang="en-US" sz="1200">
               <a:latin typeface="Garamond" charset="0"/>
@@ -15352,7 +15397,7 @@
                 <a:latin typeface="Garamond" charset="0"/>
               </a:rPr>
               <a:pPr eaLnBrk="1" hangingPunct="1"/>
-              <a:t>10/30/15</a:t>
+              <a:t>11/2/15</a:t>
             </a:fld>
             <a:endParaRPr lang="en-US" sz="1200">
               <a:latin typeface="Garamond" charset="0"/>

</xml_diff>